<commit_message>
Implement supervised model training pipeline with risk metrics integration
</commit_message>
<xml_diff>
--- a/files/Prueba_Cientifico_Datos_Compliance.pptx
+++ b/files/Prueba_Cientifico_Datos_Compliance.pptx
@@ -2483,7 +2483,33 @@
                 <a:ea typeface="+mn-ea"/>
                 <a:cs typeface="+mn-cs"/>
               </a:rPr>
-              <a:t>Científico de Datos de </a:t>
+              <a:t>Científico de Datos </a:t>
+            </a:r>
+            <a:r>
+              <a:rPr lang="es-ES" sz="2800" b="1" spc="-20" dirty="0">
+                <a:solidFill>
+                  <a:srgbClr val="D50D97"/>
+                </a:solidFill>
+                <a:latin typeface="Segoe UI"/>
+              </a:rPr>
+              <a:t>-</a:t>
+            </a:r>
+            <a:r>
+              <a:rPr lang="es-ES" sz="2800" b="1" i="0" u="none" strike="noStrike" kern="1200" cap="none" spc="-20" normalizeH="0" dirty="0">
+                <a:ln>
+                  <a:noFill/>
+                </a:ln>
+                <a:solidFill>
+                  <a:srgbClr val="D50D97"/>
+                </a:solidFill>
+                <a:effectLst/>
+                <a:uLnTx/>
+                <a:uFillTx/>
+                <a:latin typeface="Segoe UI"/>
+                <a:ea typeface="+mn-ea"/>
+                <a:cs typeface="+mn-cs"/>
+              </a:rPr>
+              <a:t> </a:t>
             </a:r>
             <a:r>
               <a:rPr lang="es-ES" sz="2800" b="1" i="0" u="none" strike="noStrike" kern="1200" cap="none" spc="-20" normalizeH="0" dirty="0" err="1">

</xml_diff>